<commit_message>
Image with HW emulation results included.
</commit_message>
<xml_diff>
--- a/presentation/Monte Carlo pi estimation.pptx
+++ b/presentation/Monte Carlo pi estimation.pptx
@@ -669,6 +669,91 @@
     </a:lvl9pPr>
   </p:notesStyle>
 </p:notesMaster>
+</file>
+
+<file path=ppt/notesSlides/notesSlide1.xml><?xml version="1.0" encoding="utf-8"?>
+<p:notes xmlns:a="http://schemas.openxmlformats.org/drawingml/2006/main" xmlns:r="http://schemas.openxmlformats.org/officeDocument/2006/relationships" xmlns:p="http://schemas.openxmlformats.org/presentationml/2006/main">
+  <p:cSld>
+    <p:spTree>
+      <p:nvGrpSpPr>
+        <p:cNvPr id="1" name=""/>
+        <p:cNvGrpSpPr/>
+        <p:nvPr/>
+      </p:nvGrpSpPr>
+      <p:grpSpPr>
+        <a:xfrm>
+          <a:off x="0" y="0"/>
+          <a:ext cx="0" cy="0"/>
+          <a:chOff x="0" y="0"/>
+          <a:chExt cx="0" cy="0"/>
+        </a:xfrm>
+      </p:grpSpPr>
+      <p:sp>
+        <p:nvSpPr>
+          <p:cNvPr id="2" name="Slide Image Placeholder 1"/>
+          <p:cNvSpPr>
+            <a:spLocks noGrp="1" noRot="1" noChangeAspect="1"/>
+          </p:cNvSpPr>
+          <p:nvPr>
+            <p:ph type="sldImg"/>
+          </p:nvPr>
+        </p:nvSpPr>
+        <p:spPr/>
+      </p:sp>
+      <p:sp>
+        <p:nvSpPr>
+          <p:cNvPr id="3" name="Notes Placeholder 2"/>
+          <p:cNvSpPr>
+            <a:spLocks noGrp="1"/>
+          </p:cNvSpPr>
+          <p:nvPr>
+            <p:ph type="body" idx="1"/>
+          </p:nvPr>
+        </p:nvSpPr>
+        <p:spPr/>
+        <p:txBody>
+          <a:bodyPr/>
+          <a:lstStyle/>
+          <a:p>
+            <a:endParaRPr lang="en-GB" dirty="0"/>
+          </a:p>
+        </p:txBody>
+      </p:sp>
+      <p:sp>
+        <p:nvSpPr>
+          <p:cNvPr id="4" name="Slide Number Placeholder 3"/>
+          <p:cNvSpPr>
+            <a:spLocks noGrp="1"/>
+          </p:cNvSpPr>
+          <p:nvPr>
+            <p:ph type="sldNum" sz="quarter" idx="5"/>
+          </p:nvPr>
+        </p:nvSpPr>
+        <p:spPr/>
+        <p:txBody>
+          <a:bodyPr/>
+          <a:lstStyle/>
+          <a:p>
+            <a:fld id="{A9D42829-8409-4711-B36D-25AE5703B863}" type="slidenum">
+              <a:rPr lang="en-US" smtClean="0"/>
+              <a:pPr/>
+              <a:t>1</a:t>
+            </a:fld>
+            <a:endParaRPr lang="en-US"/>
+          </a:p>
+        </p:txBody>
+      </p:sp>
+    </p:spTree>
+    <p:extLst>
+      <p:ext uri="{BB962C8B-B14F-4D97-AF65-F5344CB8AC3E}">
+        <p14:creationId xmlns:p14="http://schemas.microsoft.com/office/powerpoint/2010/main" val="1860158788"/>
+      </p:ext>
+    </p:extLst>
+  </p:cSld>
+  <p:clrMapOvr>
+    <a:masterClrMapping/>
+  </p:clrMapOvr>
+</p:notes>
 </file>
 
 <file path=ppt/slideLayouts/slideLayout1.xml><?xml version="1.0" encoding="utf-8"?>
@@ -1591,8 +1676,8 @@
           <a:chExt cx="0" cy="0"/>
         </a:xfrm>
       </p:grpSpPr>
-      <mc:AlternateContent xmlns:mc="http://schemas.openxmlformats.org/markup-compatibility/2006">
-        <mc:Choice xmlns:a14="http://schemas.microsoft.com/office/drawing/2010/main" Requires="a14">
+      <mc:AlternateContent xmlns:mc="http://schemas.openxmlformats.org/markup-compatibility/2006" xmlns:a14="http://schemas.microsoft.com/office/drawing/2010/main">
+        <mc:Choice Requires="a14">
           <p:sp>
             <p:nvSpPr>
               <p:cNvPr id="5" name="Title 4">
@@ -1669,7 +1754,7 @@
             </p:txBody>
           </p:sp>
         </mc:Choice>
-        <mc:Fallback>
+        <mc:Fallback xmlns="">
           <p:sp>
             <p:nvSpPr>
               <p:cNvPr id="5" name="Title 4">
@@ -1688,7 +1773,7 @@
             </p:nvSpPr>
             <p:spPr>
               <a:blipFill>
-                <a:blip r:embed="rId2"/>
+                <a:blip r:embed="rId3"/>
                 <a:stretch>
                   <a:fillRect l="-1105" t="-6875" b="-10000"/>
                 </a:stretch>
@@ -1709,8 +1794,8 @@
           </p:sp>
         </mc:Fallback>
       </mc:AlternateContent>
-      <mc:AlternateContent xmlns:mc="http://schemas.openxmlformats.org/markup-compatibility/2006">
-        <mc:Choice xmlns:a14="http://schemas.microsoft.com/office/drawing/2010/main" Requires="a14">
+      <mc:AlternateContent xmlns:mc="http://schemas.openxmlformats.org/markup-compatibility/2006" xmlns:a14="http://schemas.microsoft.com/office/drawing/2010/main">
+        <mc:Choice Requires="a14">
           <p:sp>
             <p:nvSpPr>
               <p:cNvPr id="6" name="Content Placeholder 5">
@@ -1793,7 +1878,7 @@
             </p:txBody>
           </p:sp>
         </mc:Choice>
-        <mc:Fallback>
+        <mc:Fallback xmlns="">
           <p:sp>
             <p:nvSpPr>
               <p:cNvPr id="6" name="Content Placeholder 5">
@@ -1816,7 +1901,7 @@
                 <a:ext cx="5364480" cy="2398007"/>
               </a:xfrm>
               <a:blipFill>
-                <a:blip r:embed="rId3"/>
+                <a:blip r:embed="rId4"/>
                 <a:stretch>
                   <a:fillRect l="-568" t="-1781" b="-15522"/>
                 </a:stretch>
@@ -2114,64 +2199,6 @@
       </p:sp>
       <p:pic>
         <p:nvPicPr>
-          <p:cNvPr id="1029" name="Picture 5">
-            <a:extLst>
-              <a:ext uri="{FF2B5EF4-FFF2-40B4-BE49-F238E27FC236}">
-                <a16:creationId xmlns:a16="http://schemas.microsoft.com/office/drawing/2014/main" id="{DC1DAA74-86CC-4268-9226-DD2E55611988}"/>
-              </a:ext>
-            </a:extLst>
-          </p:cNvPr>
-          <p:cNvPicPr>
-            <a:picLocks noChangeAspect="1" noChangeArrowheads="1"/>
-          </p:cNvPicPr>
-          <p:nvPr/>
-        </p:nvPicPr>
-        <p:blipFill rotWithShape="1">
-          <a:blip r:embed="rId4">
-            <a:extLst>
-              <a:ext uri="{28A0092B-C50C-407E-A947-70E740481C1C}">
-                <a14:useLocalDpi xmlns:a14="http://schemas.microsoft.com/office/drawing/2010/main" val="0"/>
-              </a:ext>
-            </a:extLst>
-          </a:blip>
-          <a:srcRect t="43106" r="25195"/>
-          <a:stretch/>
-        </p:blipFill>
-        <p:spPr bwMode="auto">
-          <a:xfrm>
-            <a:off x="6096000" y="4520999"/>
-            <a:ext cx="2158994" cy="1507674"/>
-          </a:xfrm>
-          <a:prstGeom prst="rect">
-            <a:avLst/>
-          </a:prstGeom>
-          <a:noFill/>
-          <a:ln>
-            <a:noFill/>
-          </a:ln>
-          <a:extLst>
-            <a:ext uri="{909E8E84-426E-40DD-AFC4-6F175D3DCCD1}">
-              <a14:hiddenFill xmlns:a14="http://schemas.microsoft.com/office/drawing/2010/main">
-                <a:solidFill>
-                  <a:srgbClr val="FFFFFF"/>
-                </a:solidFill>
-              </a14:hiddenFill>
-            </a:ext>
-            <a:ext uri="{91240B29-F687-4F45-9708-019B960494DF}">
-              <a14:hiddenLine xmlns:a14="http://schemas.microsoft.com/office/drawing/2010/main" w="9525">
-                <a:solidFill>
-                  <a:srgbClr val="000000"/>
-                </a:solidFill>
-                <a:miter lim="800000"/>
-                <a:headEnd/>
-                <a:tailEnd/>
-              </a14:hiddenLine>
-            </a:ext>
-          </a:extLst>
-        </p:spPr>
-      </p:pic>
-      <p:pic>
-        <p:nvPicPr>
           <p:cNvPr id="9" name="Picture 8" descr="Chart, scatter chart&#10;&#10;Description automatically generated">
             <a:extLst>
               <a:ext uri="{FF2B5EF4-FFF2-40B4-BE49-F238E27FC236}">
@@ -2222,8 +2249,66 @@
         </p:blipFill>
         <p:spPr>
           <a:xfrm>
-            <a:off x="8362610" y="5017035"/>
+            <a:off x="8395509" y="3678331"/>
             <a:ext cx="3555787" cy="1012544"/>
+          </a:xfrm>
+          <a:prstGeom prst="rect">
+            <a:avLst/>
+          </a:prstGeom>
+        </p:spPr>
+      </p:pic>
+      <p:pic>
+        <p:nvPicPr>
+          <p:cNvPr id="3" name="Picture 2">
+            <a:extLst>
+              <a:ext uri="{FF2B5EF4-FFF2-40B4-BE49-F238E27FC236}">
+                <a16:creationId xmlns:a16="http://schemas.microsoft.com/office/drawing/2014/main" id="{A300E848-3250-4ED0-8155-306568567620}"/>
+              </a:ext>
+            </a:extLst>
+          </p:cNvPr>
+          <p:cNvPicPr>
+            <a:picLocks noChangeAspect="1"/>
+          </p:cNvPicPr>
+          <p:nvPr/>
+        </p:nvPicPr>
+        <p:blipFill rotWithShape="1">
+          <a:blip r:embed="rId7"/>
+          <a:srcRect l="64175"/>
+          <a:stretch/>
+        </p:blipFill>
+        <p:spPr>
+          <a:xfrm>
+            <a:off x="7583488" y="4725144"/>
+            <a:ext cx="4367808" cy="1513817"/>
+          </a:xfrm>
+          <a:prstGeom prst="rect">
+            <a:avLst/>
+          </a:prstGeom>
+        </p:spPr>
+      </p:pic>
+      <p:pic>
+        <p:nvPicPr>
+          <p:cNvPr id="10" name="Picture 9">
+            <a:extLst>
+              <a:ext uri="{FF2B5EF4-FFF2-40B4-BE49-F238E27FC236}">
+                <a16:creationId xmlns:a16="http://schemas.microsoft.com/office/drawing/2014/main" id="{02CE48A2-C7DB-4C3D-93A6-6CD86CECA38E}"/>
+              </a:ext>
+            </a:extLst>
+          </p:cNvPr>
+          <p:cNvPicPr>
+            <a:picLocks noChangeAspect="1"/>
+          </p:cNvPicPr>
+          <p:nvPr/>
+        </p:nvPicPr>
+        <p:blipFill rotWithShape="1">
+          <a:blip r:embed="rId7"/>
+          <a:srcRect r="78350"/>
+          <a:stretch/>
+        </p:blipFill>
+        <p:spPr>
+          <a:xfrm>
+            <a:off x="4943872" y="4728884"/>
+            <a:ext cx="2639616" cy="1513817"/>
           </a:xfrm>
           <a:prstGeom prst="rect">
             <a:avLst/>
@@ -3090,15 +3175,6 @@
 </file>
 
 <file path=customXml/item1.xml><?xml version="1.0" encoding="utf-8"?>
-<?mso-contentType ?>
-<FormTemplates xmlns="http://schemas.microsoft.com/sharepoint/v3/contenttype/forms">
-  <Display>DocumentLibraryForm</Display>
-  <Edit>DocumentLibraryForm</Edit>
-  <New>DocumentLibraryForm</New>
-</FormTemplates>
-</file>
-
-<file path=customXml/item2.xml><?xml version="1.0" encoding="utf-8"?>
 <ct:contentTypeSchema xmlns:ct="http://schemas.microsoft.com/office/2006/metadata/contentType" xmlns:ma="http://schemas.microsoft.com/office/2006/metadata/properties/metaAttributes" ct:_="" ma:_="" ma:contentTypeName="Document" ma:contentTypeID="0x010100546B37FA43543848A1392F720DAB8DF3" ma:contentTypeVersion="12" ma:contentTypeDescription="Create a new document." ma:contentTypeScope="" ma:versionID="6df9016afe8d86350a8f3e4f8eed8e9c">
   <xsd:schema xmlns:xsd="http://www.w3.org/2001/XMLSchema" xmlns:xs="http://www.w3.org/2001/XMLSchema" xmlns:p="http://schemas.microsoft.com/office/2006/metadata/properties" xmlns:ns3="cb21ee11-b491-4c7a-a577-a95671055238" xmlns:ns4="cb35b90f-2172-463b-a28b-5ecc8e6d0938" targetNamespace="http://schemas.microsoft.com/office/2006/metadata/properties" ma:root="true" ma:fieldsID="be60cb04b440c17529edc7c4c51975a1" ns3:_="" ns4:_="">
     <xsd:import namespace="cb21ee11-b491-4c7a-a577-a95671055238"/>
@@ -3315,6 +3391,15 @@
 </ct:contentTypeSchema>
 </file>
 
+<file path=customXml/item2.xml><?xml version="1.0" encoding="utf-8"?>
+<?mso-contentType ?>
+<FormTemplates xmlns="http://schemas.microsoft.com/sharepoint/v3/contenttype/forms">
+  <Display>DocumentLibraryForm</Display>
+  <Edit>DocumentLibraryForm</Edit>
+  <New>DocumentLibraryForm</New>
+</FormTemplates>
+</file>
+
 <file path=customXml/item3.xml><?xml version="1.0" encoding="utf-8"?>
 <p:properties xmlns:p="http://schemas.microsoft.com/office/2006/metadata/properties" xmlns:xsi="http://www.w3.org/2001/XMLSchema-instance" xmlns:pc="http://schemas.microsoft.com/office/infopath/2007/PartnerControls">
   <documentManagement/>
@@ -3322,14 +3407,6 @@
 </file>
 
 <file path=customXml/itemProps1.xml><?xml version="1.0" encoding="utf-8"?>
-<ds:datastoreItem xmlns:ds="http://schemas.openxmlformats.org/officeDocument/2006/customXml" ds:itemID="{DD93CF04-F355-4EB4-BEFD-BE59B64F447D}">
-  <ds:schemaRefs>
-    <ds:schemaRef ds:uri="http://schemas.microsoft.com/sharepoint/v3/contenttype/forms"/>
-  </ds:schemaRefs>
-</ds:datastoreItem>
-</file>
-
-<file path=customXml/itemProps2.xml><?xml version="1.0" encoding="utf-8"?>
 <ds:datastoreItem xmlns:ds="http://schemas.openxmlformats.org/officeDocument/2006/customXml" ds:itemID="{7DF7A4D1-E745-4810-BCE4-0AFBFA4A3523}">
   <ds:schemaRefs>
     <ds:schemaRef ds:uri="http://schemas.microsoft.com/office/2006/metadata/contentType"/>
@@ -3348,6 +3425,14 @@
 </ds:datastoreItem>
 </file>
 
+<file path=customXml/itemProps2.xml><?xml version="1.0" encoding="utf-8"?>
+<ds:datastoreItem xmlns:ds="http://schemas.openxmlformats.org/officeDocument/2006/customXml" ds:itemID="{DD93CF04-F355-4EB4-BEFD-BE59B64F447D}">
+  <ds:schemaRefs>
+    <ds:schemaRef ds:uri="http://schemas.microsoft.com/sharepoint/v3/contenttype/forms"/>
+  </ds:schemaRefs>
+</ds:datastoreItem>
+</file>
+
 <file path=customXml/itemProps3.xml><?xml version="1.0" encoding="utf-8"?>
 <ds:datastoreItem xmlns:ds="http://schemas.openxmlformats.org/officeDocument/2006/customXml" ds:itemID="{BDC069C4-8BE5-43DF-9659-84C18D7F1AD9}">
   <ds:schemaRefs>

</xml_diff>